<commit_message>
A small update in ppt
</commit_message>
<xml_diff>
--- a/ANKIT GOPE_PRESENTATION.pptx
+++ b/ANKIT GOPE_PRESENTATION.pptx
@@ -5,7 +5,7 @@
     <p:sldMasterId id="2147483712" r:id="rId4"/>
   </p:sldMasterIdLst>
   <p:notesMasterIdLst>
-    <p:notesMasterId r:id="rId16"/>
+    <p:notesMasterId r:id="rId17"/>
   </p:notesMasterIdLst>
   <p:sldIdLst>
     <p:sldId id="256" r:id="rId5"/>
@@ -15,10 +15,11 @@
     <p:sldId id="265" r:id="rId9"/>
     <p:sldId id="2146847057" r:id="rId10"/>
     <p:sldId id="2146847060" r:id="rId11"/>
-    <p:sldId id="2146847062" r:id="rId12"/>
-    <p:sldId id="2146847061" r:id="rId13"/>
-    <p:sldId id="2146847055" r:id="rId14"/>
-    <p:sldId id="259" r:id="rId15"/>
+    <p:sldId id="2146847063" r:id="rId12"/>
+    <p:sldId id="2146847062" r:id="rId13"/>
+    <p:sldId id="2146847061" r:id="rId14"/>
+    <p:sldId id="2146847055" r:id="rId15"/>
+    <p:sldId id="259" r:id="rId16"/>
   </p:sldIdLst>
   <p:sldSz cx="12192000" cy="6858000"/>
   <p:notesSz cx="6858000" cy="9144000"/>
@@ -4565,19 +4566,7 @@
                 <a:latin typeface="Arial"/>
                 <a:cs typeface="Arial"/>
               </a:rPr>
-              <a:t>: INFORMATION TECHNOLOGY</a:t>
-            </a:r>
-            <a:r>
-              <a:rPr lang="en-US" sz="2000" b="1" dirty="0" smtClean="0">
-                <a:solidFill>
-                  <a:schemeClr val="accent1">
-                    <a:lumMod val="75000"/>
-                  </a:schemeClr>
-                </a:solidFill>
-                <a:latin typeface="Arial"/>
-                <a:cs typeface="Arial"/>
-              </a:rPr>
-              <a:t> </a:t>
+              <a:t>: INFORMATION TECHNOLOGY </a:t>
             </a:r>
             <a:endParaRPr lang="en-US" sz="2000" b="1" dirty="0">
               <a:solidFill>
@@ -4634,6 +4623,126 @@
       </p:grpSpPr>
       <p:sp>
         <p:nvSpPr>
+          <p:cNvPr id="2" name="Title 1">
+            <a:extLst>
+              <a:ext uri="{FF2B5EF4-FFF2-40B4-BE49-F238E27FC236}">
+                <a16:creationId xmlns:a16="http://schemas.microsoft.com/office/drawing/2014/main" id="{48E9F08C-D61F-627D-C4E5-397E3E84FC45}"/>
+              </a:ext>
+            </a:extLst>
+          </p:cNvPr>
+          <p:cNvSpPr>
+            <a:spLocks noGrp="1"/>
+          </p:cNvSpPr>
+          <p:nvPr>
+            <p:ph type="title"/>
+          </p:nvPr>
+        </p:nvSpPr>
+        <p:spPr/>
+        <p:txBody>
+          <a:bodyPr/>
+          <a:lstStyle/>
+          <a:p>
+            <a:r>
+              <a:rPr lang="en-IN" dirty="0">
+                <a:solidFill>
+                  <a:schemeClr val="accent1"/>
+                </a:solidFill>
+              </a:rPr>
+              <a:t>GitHub Link</a:t>
+            </a:r>
+          </a:p>
+        </p:txBody>
+      </p:sp>
+      <p:sp>
+        <p:nvSpPr>
+          <p:cNvPr id="3" name="Content Placeholder 2">
+            <a:extLst>
+              <a:ext uri="{FF2B5EF4-FFF2-40B4-BE49-F238E27FC236}">
+                <a16:creationId xmlns:a16="http://schemas.microsoft.com/office/drawing/2014/main" id="{51A299DD-46FA-7866-41D8-C1BFCC2F69DD}"/>
+              </a:ext>
+            </a:extLst>
+          </p:cNvPr>
+          <p:cNvSpPr>
+            <a:spLocks noGrp="1"/>
+          </p:cNvSpPr>
+          <p:nvPr>
+            <p:ph idx="1"/>
+          </p:nvPr>
+        </p:nvSpPr>
+        <p:spPr/>
+        <p:txBody>
+          <a:bodyPr/>
+          <a:lstStyle/>
+          <a:p>
+            <a:r>
+              <a:rPr lang="en-IN" dirty="0"/>
+              <a:t>https://github.com/ankitgope/Invisible-Writing-React-Python.git</a:t>
+            </a:r>
+          </a:p>
+        </p:txBody>
+      </p:sp>
+      <p:pic>
+        <p:nvPicPr>
+          <p:cNvPr id="4" name="Picture 3"/>
+          <p:cNvPicPr>
+            <a:picLocks noChangeAspect="1"/>
+          </p:cNvPicPr>
+          <p:nvPr/>
+        </p:nvPicPr>
+        <p:blipFill>
+          <a:blip r:embed="rId2">
+            <a:extLst>
+              <a:ext uri="{28A0092B-C50C-407E-A947-70E740481C1C}">
+                <a14:useLocalDpi xmlns:a14="http://schemas.microsoft.com/office/drawing/2010/main" val="0"/>
+              </a:ext>
+            </a:extLst>
+          </a:blip>
+          <a:stretch>
+            <a:fillRect/>
+          </a:stretch>
+        </p:blipFill>
+        <p:spPr>
+          <a:xfrm>
+            <a:off x="6946710" y="1498734"/>
+            <a:ext cx="4490115" cy="4279908"/>
+          </a:xfrm>
+          <a:prstGeom prst="rect">
+            <a:avLst/>
+          </a:prstGeom>
+        </p:spPr>
+      </p:pic>
+    </p:spTree>
+    <p:extLst>
+      <p:ext uri="{BB962C8B-B14F-4D97-AF65-F5344CB8AC3E}">
+        <p14:creationId xmlns:p14="http://schemas.microsoft.com/office/powerpoint/2010/main" val="2230664768"/>
+      </p:ext>
+    </p:extLst>
+  </p:cSld>
+  <p:clrMapOvr>
+    <a:masterClrMapping/>
+  </p:clrMapOvr>
+</p:sld>
+</file>
+
+<file path=ppt/slides/slide11.xml><?xml version="1.0" encoding="utf-8"?>
+<p:sld xmlns:a="http://schemas.openxmlformats.org/drawingml/2006/main" xmlns:r="http://schemas.openxmlformats.org/officeDocument/2006/relationships" xmlns:p="http://schemas.openxmlformats.org/presentationml/2006/main">
+  <p:cSld>
+    <p:spTree>
+      <p:nvGrpSpPr>
+        <p:cNvPr id="1" name=""/>
+        <p:cNvGrpSpPr/>
+        <p:nvPr/>
+      </p:nvGrpSpPr>
+      <p:grpSpPr>
+        <a:xfrm>
+          <a:off x="0" y="0"/>
+          <a:ext cx="0" cy="0"/>
+          <a:chOff x="0" y="0"/>
+          <a:chExt cx="0" cy="0"/>
+        </a:xfrm>
+      </p:grpSpPr>
+      <p:sp>
+        <p:nvSpPr>
           <p:cNvPr id="3" name="Content Placeholder 2">
             <a:extLst>
               <a:ext uri="{FF2B5EF4-FFF2-40B4-BE49-F238E27FC236}">
@@ -4955,7 +5064,7 @@
 </p:sld>
 </file>
 
-<file path=ppt/slides/slide11.xml><?xml version="1.0" encoding="utf-8"?>
+<file path=ppt/slides/slide12.xml><?xml version="1.0" encoding="utf-8"?>
 <p:sld xmlns:a="http://schemas.openxmlformats.org/drawingml/2006/main" xmlns:r="http://schemas.openxmlformats.org/officeDocument/2006/relationships" xmlns:p="http://schemas.openxmlformats.org/presentationml/2006/main">
   <p:cSld>
     <p:spTree>
@@ -6647,13 +6756,34 @@
           <a:lstStyle/>
           <a:p>
             <a:r>
-              <a:rPr lang="en-IN" dirty="0">
+              <a:rPr lang="en-IN" dirty="0" smtClean="0">
                 <a:solidFill>
                   <a:schemeClr val="accent1"/>
                 </a:solidFill>
               </a:rPr>
-              <a:t>Results</a:t>
-            </a:r>
+              <a:t>Results (</a:t>
+            </a:r>
+            <a:r>
+              <a:rPr lang="en-IN" dirty="0" err="1" smtClean="0">
+                <a:solidFill>
+                  <a:schemeClr val="accent1"/>
+                </a:solidFill>
+              </a:rPr>
+              <a:t>FrONTEND</a:t>
+            </a:r>
+            <a:r>
+              <a:rPr lang="en-IN" dirty="0" smtClean="0">
+                <a:solidFill>
+                  <a:schemeClr val="accent1"/>
+                </a:solidFill>
+              </a:rPr>
+              <a:t> – REACT JS)</a:t>
+            </a:r>
+            <a:endParaRPr lang="en-IN" dirty="0">
+              <a:solidFill>
+                <a:schemeClr val="accent1"/>
+              </a:solidFill>
+            </a:endParaRPr>
           </a:p>
         </p:txBody>
       </p:sp>
@@ -6808,128 +6938,64 @@
       </p:grpSpPr>
       <p:sp>
         <p:nvSpPr>
-          <p:cNvPr id="2" name="Title 1">
+          <p:cNvPr id="2" name="Title 1"/>
+          <p:cNvSpPr>
+            <a:spLocks noGrp="1"/>
+          </p:cNvSpPr>
+          <p:nvPr>
+            <p:ph type="title"/>
+          </p:nvPr>
+        </p:nvSpPr>
+        <p:spPr/>
+        <p:txBody>
+          <a:bodyPr/>
+          <a:lstStyle/>
+          <a:p>
+            <a:r>
+              <a:rPr lang="en-IN" dirty="0" smtClean="0">
+                <a:solidFill>
+                  <a:schemeClr val="accent1"/>
+                </a:solidFill>
+              </a:rPr>
+              <a:t>Results (BACKEND – PYTHON FLASK)</a:t>
+            </a:r>
+            <a:endParaRPr lang="en-IN" dirty="0"/>
+          </a:p>
+        </p:txBody>
+      </p:sp>
+      <p:pic>
+        <p:nvPicPr>
+          <p:cNvPr id="4" name="Content Placeholder 3"/>
+          <p:cNvPicPr>
+            <a:picLocks noGrp="1" noChangeAspect="1"/>
+          </p:cNvPicPr>
+          <p:nvPr>
+            <p:ph idx="1"/>
+          </p:nvPr>
+        </p:nvPicPr>
+        <p:blipFill>
+          <a:blip r:embed="rId2">
             <a:extLst>
-              <a:ext uri="{FF2B5EF4-FFF2-40B4-BE49-F238E27FC236}">
-                <a16:creationId xmlns:a16="http://schemas.microsoft.com/office/drawing/2014/main" id="{FA4C6B3D-1072-C2D2-EBFE-E33CABE394D1}"/>
+              <a:ext uri="{28A0092B-C50C-407E-A947-70E740481C1C}">
+                <a14:useLocalDpi xmlns:a14="http://schemas.microsoft.com/office/drawing/2010/main" val="0"/>
               </a:ext>
             </a:extLst>
-          </p:cNvPr>
-          <p:cNvSpPr>
-            <a:spLocks noGrp="1"/>
-          </p:cNvSpPr>
-          <p:nvPr>
-            <p:ph type="title"/>
-          </p:nvPr>
-        </p:nvSpPr>
-        <p:spPr/>
-        <p:txBody>
-          <a:bodyPr/>
-          <a:lstStyle/>
-          <a:p>
-            <a:r>
-              <a:rPr lang="en-IN" dirty="0">
-                <a:solidFill>
-                  <a:schemeClr val="accent1"/>
-                </a:solidFill>
-              </a:rPr>
-              <a:t>Conclusion</a:t>
-            </a:r>
-          </a:p>
-        </p:txBody>
-      </p:sp>
-      <p:sp>
-        <p:nvSpPr>
-          <p:cNvPr id="3" name="Content Placeholder 2">
-            <a:extLst>
-              <a:ext uri="{FF2B5EF4-FFF2-40B4-BE49-F238E27FC236}">
-                <a16:creationId xmlns:a16="http://schemas.microsoft.com/office/drawing/2014/main" id="{D4974547-DF1B-77BB-E545-9344EDB9AD3F}"/>
-              </a:ext>
-            </a:extLst>
-          </p:cNvPr>
-          <p:cNvSpPr>
-            <a:spLocks noGrp="1"/>
-          </p:cNvSpPr>
-          <p:nvPr>
-            <p:ph idx="1"/>
-          </p:nvPr>
-        </p:nvSpPr>
-        <p:spPr/>
-        <p:txBody>
-          <a:bodyPr/>
-          <a:lstStyle/>
-          <a:p>
-            <a:pPr marL="0" indent="0">
-              <a:buNone/>
-            </a:pPr>
-            <a:r>
-              <a:rPr lang="en-US" dirty="0"/>
-              <a:t>This steganography project provides a </a:t>
-            </a:r>
-            <a:r>
-              <a:rPr lang="en-US" b="1" dirty="0"/>
-              <a:t>secure and user-friendly</a:t>
-            </a:r>
-            <a:r>
-              <a:rPr lang="en-US" dirty="0"/>
-              <a:t> way to </a:t>
-            </a:r>
-            <a:r>
-              <a:rPr lang="en-US" b="1" dirty="0"/>
-              <a:t>hide and extract messages</a:t>
-            </a:r>
-            <a:r>
-              <a:rPr lang="en-US" dirty="0"/>
-              <a:t> within images using </a:t>
-            </a:r>
-            <a:r>
-              <a:rPr lang="en-US" b="1" dirty="0"/>
-              <a:t>React and Flask</a:t>
-            </a:r>
-            <a:r>
-              <a:rPr lang="en-US" dirty="0"/>
-              <a:t>. It demonstrates the power of </a:t>
-            </a:r>
-            <a:r>
-              <a:rPr lang="en-US" b="1" dirty="0"/>
-              <a:t>data concealment</a:t>
-            </a:r>
-            <a:r>
-              <a:rPr lang="en-US" dirty="0"/>
-              <a:t>, offering practical applications for </a:t>
-            </a:r>
-            <a:r>
-              <a:rPr lang="en-US" b="1" dirty="0"/>
-              <a:t>privacy protection, secure communication, and cybersecurity learning</a:t>
-            </a:r>
-            <a:r>
-              <a:rPr lang="en-US" dirty="0"/>
-              <a:t>. With its </a:t>
-            </a:r>
-            <a:r>
-              <a:rPr lang="en-US" b="1" dirty="0"/>
-              <a:t>intuitive interface and seamless encryption/decryption process</a:t>
-            </a:r>
-            <a:r>
-              <a:rPr lang="en-US" dirty="0"/>
-              <a:t>, the project makes steganography accessible to both </a:t>
-            </a:r>
-            <a:r>
-              <a:rPr lang="en-US" b="1" dirty="0"/>
-              <a:t>technical and non-technical users</a:t>
-            </a:r>
-            <a:r>
-              <a:rPr lang="en-US" dirty="0"/>
-              <a:t>.</a:t>
-            </a:r>
-            <a:endParaRPr lang="en-IN" dirty="0"/>
-          </a:p>
-        </p:txBody>
-      </p:sp>
+          </a:blip>
+          <a:stretch>
+            <a:fillRect/>
+          </a:stretch>
+        </p:blipFill>
+        <p:spPr>
+          <a:xfrm>
+            <a:off x="581192" y="1329045"/>
+            <a:ext cx="11029616" cy="5017163"/>
+          </a:xfrm>
+        </p:spPr>
+      </p:pic>
     </p:spTree>
     <p:extLst>
       <p:ext uri="{BB962C8B-B14F-4D97-AF65-F5344CB8AC3E}">
-        <p14:creationId xmlns:p14="http://schemas.microsoft.com/office/powerpoint/2010/main" val="4233882376"/>
+        <p14:creationId xmlns:p14="http://schemas.microsoft.com/office/powerpoint/2010/main" val="1900229192"/>
       </p:ext>
     </p:extLst>
   </p:cSld>
@@ -6961,7 +7027,7 @@
           <p:cNvPr id="2" name="Title 1">
             <a:extLst>
               <a:ext uri="{FF2B5EF4-FFF2-40B4-BE49-F238E27FC236}">
-                <a16:creationId xmlns:a16="http://schemas.microsoft.com/office/drawing/2014/main" id="{48E9F08C-D61F-627D-C4E5-397E3E84FC45}"/>
+                <a16:creationId xmlns:a16="http://schemas.microsoft.com/office/drawing/2014/main" id="{FA4C6B3D-1072-C2D2-EBFE-E33CABE394D1}"/>
               </a:ext>
             </a:extLst>
           </p:cNvPr>
@@ -6983,7 +7049,7 @@
                   <a:schemeClr val="accent1"/>
                 </a:solidFill>
               </a:rPr>
-              <a:t>GitHub Link</a:t>
+              <a:t>Conclusion</a:t>
             </a:r>
           </a:p>
         </p:txBody>
@@ -6993,7 +7059,7 @@
           <p:cNvPr id="3" name="Content Placeholder 2">
             <a:extLst>
               <a:ext uri="{FF2B5EF4-FFF2-40B4-BE49-F238E27FC236}">
-                <a16:creationId xmlns:a16="http://schemas.microsoft.com/office/drawing/2014/main" id="{51A299DD-46FA-7866-41D8-C1BFCC2F69DD}"/>
+                <a16:creationId xmlns:a16="http://schemas.microsoft.com/office/drawing/2014/main" id="{D4974547-DF1B-77BB-E545-9344EDB9AD3F}"/>
               </a:ext>
             </a:extLst>
           </p:cNvPr>
@@ -7009,48 +7075,77 @@
           <a:bodyPr/>
           <a:lstStyle/>
           <a:p>
-            <a:r>
-              <a:rPr lang="en-IN" dirty="0"/>
-              <a:t>https://github.com/ankitgope/Invisible-Writing-React-Python.git</a:t>
+            <a:pPr marL="0" indent="0">
+              <a:buNone/>
+            </a:pPr>
+            <a:r>
+              <a:rPr lang="en-US" dirty="0"/>
+              <a:t>This steganography project provides a </a:t>
+            </a:r>
+            <a:r>
+              <a:rPr lang="en-US" b="1" dirty="0"/>
+              <a:t>secure and user-friendly</a:t>
+            </a:r>
+            <a:r>
+              <a:rPr lang="en-US" dirty="0"/>
+              <a:t> way to </a:t>
+            </a:r>
+            <a:r>
+              <a:rPr lang="en-US" b="1" dirty="0"/>
+              <a:t>hide and extract messages</a:t>
+            </a:r>
+            <a:r>
+              <a:rPr lang="en-US" dirty="0"/>
+              <a:t> within images using </a:t>
+            </a:r>
+            <a:r>
+              <a:rPr lang="en-US" b="1" dirty="0"/>
+              <a:t>React and Flask</a:t>
+            </a:r>
+            <a:r>
+              <a:rPr lang="en-US" dirty="0"/>
+              <a:t>. It demonstrates the power of </a:t>
+            </a:r>
+            <a:r>
+              <a:rPr lang="en-US" b="1" dirty="0"/>
+              <a:t>data concealment</a:t>
+            </a:r>
+            <a:r>
+              <a:rPr lang="en-US" dirty="0"/>
+              <a:t>, offering practical applications for </a:t>
+            </a:r>
+            <a:r>
+              <a:rPr lang="en-US" b="1" dirty="0"/>
+              <a:t>privacy protection, secure communication, and cybersecurity learning</a:t>
+            </a:r>
+            <a:r>
+              <a:rPr lang="en-US" dirty="0"/>
+              <a:t>. With its </a:t>
+            </a:r>
+            <a:r>
+              <a:rPr lang="en-US" b="1" dirty="0"/>
+              <a:t>intuitive interface and seamless encryption/decryption process</a:t>
+            </a:r>
+            <a:r>
+              <a:rPr lang="en-US" dirty="0"/>
+              <a:t>, the project makes steganography accessible to both </a:t>
+            </a:r>
+            <a:r>
+              <a:rPr lang="en-US" b="1" dirty="0"/>
+              <a:t>technical and non-technical users</a:t>
+            </a:r>
+            <a:r>
+              <a:rPr lang="en-US" dirty="0"/>
+              <a:t>.</a:t>
             </a:r>
             <a:endParaRPr lang="en-IN" dirty="0"/>
           </a:p>
         </p:txBody>
       </p:sp>
-      <p:pic>
-        <p:nvPicPr>
-          <p:cNvPr id="4" name="Picture 3"/>
-          <p:cNvPicPr>
-            <a:picLocks noChangeAspect="1"/>
-          </p:cNvPicPr>
-          <p:nvPr/>
-        </p:nvPicPr>
-        <p:blipFill>
-          <a:blip r:embed="rId2">
-            <a:extLst>
-              <a:ext uri="{28A0092B-C50C-407E-A947-70E740481C1C}">
-                <a14:useLocalDpi xmlns:a14="http://schemas.microsoft.com/office/drawing/2010/main" val="0"/>
-              </a:ext>
-            </a:extLst>
-          </a:blip>
-          <a:stretch>
-            <a:fillRect/>
-          </a:stretch>
-        </p:blipFill>
-        <p:spPr>
-          <a:xfrm>
-            <a:off x="6946710" y="1498734"/>
-            <a:ext cx="4490115" cy="4279908"/>
-          </a:xfrm>
-          <a:prstGeom prst="rect">
-            <a:avLst/>
-          </a:prstGeom>
-        </p:spPr>
-      </p:pic>
     </p:spTree>
     <p:extLst>
       <p:ext uri="{BB962C8B-B14F-4D97-AF65-F5344CB8AC3E}">
-        <p14:creationId xmlns:p14="http://schemas.microsoft.com/office/powerpoint/2010/main" val="2230664768"/>
+        <p14:creationId xmlns:p14="http://schemas.microsoft.com/office/powerpoint/2010/main" val="4233882376"/>
       </p:ext>
     </p:extLst>
   </p:cSld>
@@ -7634,6 +7729,14 @@
 </file>
 
 <file path=customXml/item2.xml><?xml version="1.0" encoding="utf-8"?>
+<p:properties xmlns:p="http://schemas.microsoft.com/office/2006/metadata/properties" xmlns:xsi="http://www.w3.org/2001/XMLSchema-instance" xmlns:pc="http://schemas.microsoft.com/office/infopath/2007/PartnerControls">
+  <documentManagement>
+    <_activity xmlns="b30265f8-c5e2-4918-b4a1-b977299ca3e2" xsi:nil="true"/>
+  </documentManagement>
+</p:properties>
+</file>
+
+<file path=customXml/item3.xml><?xml version="1.0" encoding="utf-8"?>
 <ct:contentTypeSchema xmlns:ct="http://schemas.microsoft.com/office/2006/metadata/contentType" xmlns:ma="http://schemas.microsoft.com/office/2006/metadata/properties/metaAttributes" ct:_="" ma:_="" ma:contentTypeName="Document" ma:contentTypeID="0x0101007F0268AC5E70984D8FE60B7154176407" ma:contentTypeVersion="15" ma:contentTypeDescription="Create a new document." ma:contentTypeScope="" ma:versionID="104e359103f0f57b1cf9676756e5b944">
   <xsd:schema xmlns:xsd="http://www.w3.org/2001/XMLSchema" xmlns:xs="http://www.w3.org/2001/XMLSchema" xmlns:p="http://schemas.microsoft.com/office/2006/metadata/properties" xmlns:ns3="b30265f8-c5e2-4918-b4a1-b977299ca3e2" xmlns:ns4="fadb41d3-f9cb-40fb-903c-8cacaba95bb5" targetNamespace="http://schemas.microsoft.com/office/2006/metadata/properties" ma:root="true" ma:fieldsID="5615b8f8aa772998bad551f24a33de0e" ns3:_="" ns4:_="">
     <xsd:import namespace="b30265f8-c5e2-4918-b4a1-b977299ca3e2"/>
@@ -7866,14 +7969,6 @@
 </ct:contentTypeSchema>
 </file>
 
-<file path=customXml/item3.xml><?xml version="1.0" encoding="utf-8"?>
-<p:properties xmlns:p="http://schemas.microsoft.com/office/2006/metadata/properties" xmlns:xsi="http://www.w3.org/2001/XMLSchema-instance" xmlns:pc="http://schemas.microsoft.com/office/infopath/2007/PartnerControls">
-  <documentManagement>
-    <_activity xmlns="b30265f8-c5e2-4918-b4a1-b977299ca3e2" xsi:nil="true"/>
-  </documentManagement>
-</p:properties>
-</file>
-
 <file path=customXml/itemProps1.xml><?xml version="1.0" encoding="utf-8"?>
 <ds:datastoreItem xmlns:ds="http://schemas.openxmlformats.org/officeDocument/2006/customXml" ds:itemID="{927BD4C1-B6B1-4715-ABF9-E660A51A4EA0}">
   <ds:schemaRefs>
@@ -7883,6 +7978,23 @@
 </file>
 
 <file path=customXml/itemProps2.xml><?xml version="1.0" encoding="utf-8"?>
+<ds:datastoreItem xmlns:ds="http://schemas.openxmlformats.org/officeDocument/2006/customXml" ds:itemID="{8D289AE2-D2AE-49D1-AFAC-3A79F6794255}">
+  <ds:schemaRefs>
+    <ds:schemaRef ds:uri="http://schemas.openxmlformats.org/package/2006/metadata/core-properties"/>
+    <ds:schemaRef ds:uri="http://schemas.microsoft.com/office/2006/documentManagement/types"/>
+    <ds:schemaRef ds:uri="http://purl.org/dc/elements/1.1/"/>
+    <ds:schemaRef ds:uri="http://purl.org/dc/dcmitype/"/>
+    <ds:schemaRef ds:uri="http://schemas.microsoft.com/office/2006/metadata/properties"/>
+    <ds:schemaRef ds:uri="http://schemas.microsoft.com/office/infopath/2007/PartnerControls"/>
+    <ds:schemaRef ds:uri="fadb41d3-f9cb-40fb-903c-8cacaba95bb5"/>
+    <ds:schemaRef ds:uri="b30265f8-c5e2-4918-b4a1-b977299ca3e2"/>
+    <ds:schemaRef ds:uri="http://www.w3.org/XML/1998/namespace"/>
+    <ds:schemaRef ds:uri="http://purl.org/dc/terms/"/>
+  </ds:schemaRefs>
+</ds:datastoreItem>
+</file>
+
+<file path=customXml/itemProps3.xml><?xml version="1.0" encoding="utf-8"?>
 <ds:datastoreItem xmlns:ds="http://schemas.openxmlformats.org/officeDocument/2006/customXml" ds:itemID="{9DD71778-17EE-4151-88AE-C8F4E8043BD9}">
   <ds:schemaRefs>
     <ds:schemaRef ds:uri="http://schemas.microsoft.com/office/2006/metadata/contentType"/>
@@ -7899,21 +8011,4 @@
     <ds:schemaRef ds:uri="http://schemas.microsoft.com/internal/obd"/>
   </ds:schemaRefs>
 </ds:datastoreItem>
-</file>
-
-<file path=customXml/itemProps3.xml><?xml version="1.0" encoding="utf-8"?>
-<ds:datastoreItem xmlns:ds="http://schemas.openxmlformats.org/officeDocument/2006/customXml" ds:itemID="{8D289AE2-D2AE-49D1-AFAC-3A79F6794255}">
-  <ds:schemaRefs>
-    <ds:schemaRef ds:uri="http://schemas.openxmlformats.org/package/2006/metadata/core-properties"/>
-    <ds:schemaRef ds:uri="http://schemas.microsoft.com/office/2006/documentManagement/types"/>
-    <ds:schemaRef ds:uri="http://purl.org/dc/elements/1.1/"/>
-    <ds:schemaRef ds:uri="http://purl.org/dc/dcmitype/"/>
-    <ds:schemaRef ds:uri="http://schemas.microsoft.com/office/2006/metadata/properties"/>
-    <ds:schemaRef ds:uri="http://schemas.microsoft.com/office/infopath/2007/PartnerControls"/>
-    <ds:schemaRef ds:uri="fadb41d3-f9cb-40fb-903c-8cacaba95bb5"/>
-    <ds:schemaRef ds:uri="b30265f8-c5e2-4918-b4a1-b977299ca3e2"/>
-    <ds:schemaRef ds:uri="http://www.w3.org/XML/1998/namespace"/>
-    <ds:schemaRef ds:uri="http://purl.org/dc/terms/"/>
-  </ds:schemaRefs>
-</ds:datastoreItem>
 </file>
</xml_diff>